<commit_message>
Remove unused trophy SVG and update onboarding validation schema to include new SIRET handling logic
</commit_message>
<xml_diff>
--- a/Docs/Rapport de sprint Renford.pptx
+++ b/Docs/Rapport de sprint Renford.pptx
@@ -18,7 +18,7 @@
   <p:notesSz cx="6858000" cy="12192000"/>
   <p:embeddedFontLst>
     <p:embeddedFont>
-      <p:font typeface="Open Sans" panose="020B0606030504020204" pitchFamily="34" charset="0"/>
+      <p:font typeface="Open Sans" pitchFamily="2" charset="0"/>
       <p:regular r:id="rId8"/>
       <p:bold r:id="rId9"/>
       <p:italic r:id="rId10"/>
@@ -1211,7 +1211,7 @@
                 <a:cs typeface="Calibri"/>
                 <a:sym typeface="Calibri"/>
               </a:rPr>
-              <a:t>‹N°›</a:t>
+              <a:t>‹#›</a:t>
             </a:fld>
             <a:endParaRPr sz="1200" b="0" i="0" u="none" strike="noStrike" cap="none">
               <a:solidFill>
@@ -1730,7 +1730,7 @@
               </a:spcAft>
               <a:buNone/>
             </a:pPr>
-            <a:endParaRPr/>
+            <a:endParaRPr dirty="0"/>
           </a:p>
         </p:txBody>
       </p:sp>
@@ -6971,14 +6971,14 @@
           <p:nvPr>
             <p:extLst>
               <p:ext uri="{D42A27DB-BD31-4B8C-83A1-F6EECF244321}">
-                <p14:modId xmlns:p14="http://schemas.microsoft.com/office/powerpoint/2010/main" val="1420500020"/>
+                <p14:modId xmlns:p14="http://schemas.microsoft.com/office/powerpoint/2010/main" val="2433275082"/>
               </p:ext>
             </p:extLst>
           </p:nvPr>
         </p:nvGraphicFramePr>
         <p:xfrm>
-          <a:off x="381300" y="1416288"/>
-          <a:ext cx="11291752" cy="4463026"/>
+          <a:off x="381300" y="1416289"/>
+          <a:ext cx="11291752" cy="4345775"/>
         </p:xfrm>
         <a:graphic>
           <a:graphicData uri="http://schemas.openxmlformats.org/drawingml/2006/table">
@@ -7073,7 +7073,7 @@
                   </a:extLst>
                 </a:gridCol>
               </a:tblGrid>
-              <a:tr h="645976">
+              <a:tr h="464941">
                 <a:tc>
                   <a:txBody>
                     <a:bodyPr/>
@@ -7089,7 +7089,7 @@
                         <a:buNone/>
                       </a:pPr>
                       <a:r>
-                        <a:rPr lang="en-US" sz="1000" b="1">
+                        <a:rPr lang="en-US" sz="1000" b="1" dirty="0">
                           <a:solidFill>
                             <a:schemeClr val="lt1"/>
                           </a:solidFill>
@@ -7100,7 +7100,7 @@
                         </a:rPr>
                         <a:t>SPRINT</a:t>
                       </a:r>
-                      <a:endParaRPr/>
+                      <a:endParaRPr dirty="0"/>
                     </a:p>
                   </a:txBody>
                   <a:tcPr marL="91425" marR="91425" marT="91425" marB="91425" anchor="ctr">
@@ -7538,7 +7538,7 @@
                   </a:ext>
                 </a:extLst>
               </a:tr>
-              <a:tr h="636175">
+              <a:tr h="457887">
                 <a:tc>
                   <a:txBody>
                     <a:bodyPr/>
@@ -7602,7 +7602,7 @@
                           <a:effectLst/>
                           <a:latin typeface="Syne" panose="020B0604020202020204" charset="0"/>
                         </a:rPr>
-                        <a:t>Architecture de base de données</a:t>
+                        <a:t>Cadrage projet, Configuration, Architecture BDD </a:t>
                       </a:r>
                       <a:endParaRPr sz="1000" b="1" dirty="0">
                         <a:solidFill>
@@ -7677,7 +7677,7 @@
                         </a:spcAft>
                         <a:buNone/>
                       </a:pPr>
-                      <a:endParaRPr/>
+                      <a:endParaRPr dirty="0"/>
                     </a:p>
                   </a:txBody>
                   <a:tcPr marL="91425" marR="91425" marT="91425" marB="91425"/>
@@ -7821,7 +7821,7 @@
                   </a:ext>
                 </a:extLst>
               </a:tr>
-              <a:tr h="636175">
+              <a:tr h="457887">
                 <a:tc>
                   <a:txBody>
                     <a:bodyPr/>
@@ -7885,7 +7885,17 @@
                           <a:effectLst/>
                           <a:latin typeface="Syne" panose="020B0604020202020204" charset="0"/>
                         </a:rPr>
-                        <a:t>Développement du backend</a:t>
+                        <a:t>Authentification &amp; </a:t>
+                      </a:r>
+                      <a:r>
+                        <a:rPr lang="fr-FR" sz="1000" b="1" i="0" dirty="0" err="1">
+                          <a:solidFill>
+                            <a:schemeClr val="bg1"/>
+                          </a:solidFill>
+                          <a:effectLst/>
+                          <a:latin typeface="Syne" panose="020B0604020202020204" charset="0"/>
+                        </a:rPr>
+                        <a:t>Onboarding</a:t>
                       </a:r>
                       <a:endParaRPr sz="1000" b="1" dirty="0">
                         <a:solidFill>
@@ -7960,9 +7970,7 @@
                     </a:p>
                   </a:txBody>
                   <a:tcPr marL="91425" marR="91425" marT="91425" marB="91425">
-                    <a:solidFill>
-                      <a:srgbClr val="7030A0"/>
-                    </a:solidFill>
+                    <a:noFill/>
                   </a:tcPr>
                 </a:tc>
                 <a:tc>
@@ -7983,9 +7991,7 @@
                     </a:p>
                   </a:txBody>
                   <a:tcPr marL="91425" marR="91425" marT="91425" marB="91425">
-                    <a:solidFill>
-                      <a:srgbClr val="7030A0"/>
-                    </a:solidFill>
+                    <a:noFill/>
                   </a:tcPr>
                 </a:tc>
                 <a:tc>
@@ -8112,7 +8118,7 @@
                   </a:ext>
                 </a:extLst>
               </a:tr>
-              <a:tr h="636175">
+              <a:tr h="457887">
                 <a:tc>
                   <a:txBody>
                     <a:bodyPr/>
@@ -8176,7 +8182,27 @@
                           <a:effectLst/>
                           <a:latin typeface="Syne" panose="020B0604020202020204" charset="0"/>
                         </a:rPr>
-                        <a:t>Développement du frontend (App / Backoffice)</a:t>
+                        <a:t>Profils Utilisateurs (</a:t>
+                      </a:r>
+                      <a:r>
+                        <a:rPr lang="fr-FR" sz="1000" b="1" i="0" dirty="0" err="1">
+                          <a:solidFill>
+                            <a:schemeClr val="bg1"/>
+                          </a:solidFill>
+                          <a:effectLst/>
+                          <a:latin typeface="Syne" panose="020B0604020202020204" charset="0"/>
+                        </a:rPr>
+                        <a:t>Renford</a:t>
+                      </a:r>
+                      <a:r>
+                        <a:rPr lang="fr-FR" sz="1000" b="1" i="0" dirty="0">
+                          <a:solidFill>
+                            <a:schemeClr val="bg1"/>
+                          </a:solidFill>
+                          <a:effectLst/>
+                          <a:latin typeface="Syne" panose="020B0604020202020204" charset="0"/>
+                        </a:rPr>
+                        <a:t> + Établissement)</a:t>
                       </a:r>
                       <a:endParaRPr sz="1000" b="1" dirty="0">
                         <a:solidFill>
@@ -8243,29 +8269,14 @@
                         </a:spcAft>
                         <a:buNone/>
                       </a:pPr>
-                      <a:endParaRPr/>
-                    </a:p>
-                  </a:txBody>
-                  <a:tcPr marL="91425" marR="91425" marT="91425" marB="91425"/>
-                </a:tc>
-                <a:tc>
-                  <a:txBody>
-                    <a:bodyPr/>
-                    <a:lstStyle/>
-                    <a:p>
-                      <a:pPr marL="0" lvl="0" indent="0" algn="l" rtl="0">
-                        <a:spcBef>
-                          <a:spcPts val="0"/>
-                        </a:spcBef>
-                        <a:spcAft>
-                          <a:spcPts val="0"/>
-                        </a:spcAft>
-                        <a:buNone/>
-                      </a:pPr>
                       <a:endParaRPr dirty="0"/>
                     </a:p>
                   </a:txBody>
-                  <a:tcPr marL="91425" marR="91425" marT="91425" marB="91425"/>
+                  <a:tcPr marL="91425" marR="91425" marT="91425" marB="91425">
+                    <a:solidFill>
+                      <a:srgbClr val="7030A0"/>
+                    </a:solidFill>
+                  </a:tcPr>
                 </a:tc>
                 <a:tc>
                   <a:txBody>
@@ -8308,9 +8319,7 @@
                     </a:p>
                   </a:txBody>
                   <a:tcPr marL="91425" marR="91425" marT="91425" marB="91425">
-                    <a:solidFill>
-                      <a:srgbClr val="7030A0"/>
-                    </a:solidFill>
+                    <a:noFill/>
                   </a:tcPr>
                 </a:tc>
                 <a:tc>
@@ -8331,9 +8340,28 @@
                     </a:p>
                   </a:txBody>
                   <a:tcPr marL="91425" marR="91425" marT="91425" marB="91425">
-                    <a:solidFill>
-                      <a:srgbClr val="7030A0"/>
-                    </a:solidFill>
+                    <a:noFill/>
+                  </a:tcPr>
+                </a:tc>
+                <a:tc>
+                  <a:txBody>
+                    <a:bodyPr/>
+                    <a:lstStyle/>
+                    <a:p>
+                      <a:pPr marL="0" lvl="0" indent="0" algn="l" rtl="0">
+                        <a:spcBef>
+                          <a:spcPts val="0"/>
+                        </a:spcBef>
+                        <a:spcAft>
+                          <a:spcPts val="0"/>
+                        </a:spcAft>
+                        <a:buNone/>
+                      </a:pPr>
+                      <a:endParaRPr dirty="0"/>
+                    </a:p>
+                  </a:txBody>
+                  <a:tcPr marL="91425" marR="91425" marT="91425" marB="91425">
+                    <a:noFill/>
                   </a:tcPr>
                 </a:tc>
                 <a:tc>
@@ -8411,7 +8439,7 @@
                   </a:ext>
                 </a:extLst>
               </a:tr>
-              <a:tr h="636175">
+              <a:tr h="457887">
                 <a:tc>
                   <a:txBody>
                     <a:bodyPr/>
@@ -8475,7 +8503,7 @@
                           <a:effectLst/>
                           <a:latin typeface="Syne" panose="020B0604020202020204" charset="0"/>
                         </a:rPr>
-                        <a:t>Interfaçage du frontend est backend (App / Backoffice)</a:t>
+                        <a:t>Système de Missions (FLEX + COACH) </a:t>
                       </a:r>
                       <a:endParaRPr sz="1000" b="1" dirty="0">
                         <a:solidFill>
@@ -8583,45 +8611,11 @@
                       <a:endParaRPr dirty="0"/>
                     </a:p>
                   </a:txBody>
-                  <a:tcPr marL="91425" marR="91425" marT="91425" marB="91425"/>
-                </a:tc>
-                <a:tc>
-                  <a:txBody>
-                    <a:bodyPr/>
-                    <a:lstStyle/>
-                    <a:p>
-                      <a:pPr marL="0" lvl="0" indent="0" algn="l" rtl="0">
-                        <a:spcBef>
-                          <a:spcPts val="0"/>
-                        </a:spcBef>
-                        <a:spcAft>
-                          <a:spcPts val="0"/>
-                        </a:spcAft>
-                        <a:buNone/>
-                      </a:pPr>
-                      <a:endParaRPr/>
-                    </a:p>
-                  </a:txBody>
-                  <a:tcPr marL="91425" marR="91425" marT="91425" marB="91425"/>
-                </a:tc>
-                <a:tc>
-                  <a:txBody>
-                    <a:bodyPr/>
-                    <a:lstStyle/>
-                    <a:p>
-                      <a:pPr marL="0" lvl="0" indent="0" algn="l" rtl="0">
-                        <a:spcBef>
-                          <a:spcPts val="0"/>
-                        </a:spcBef>
-                        <a:spcAft>
-                          <a:spcPts val="0"/>
-                        </a:spcAft>
-                        <a:buNone/>
-                      </a:pPr>
-                      <a:endParaRPr/>
-                    </a:p>
-                  </a:txBody>
-                  <a:tcPr marL="91425" marR="91425" marT="91425" marB="91425"/>
+                  <a:tcPr marL="91425" marR="91425" marT="91425" marB="91425">
+                    <a:solidFill>
+                      <a:srgbClr val="7030A0"/>
+                    </a:solidFill>
+                  </a:tcPr>
                 </a:tc>
                 <a:tc>
                   <a:txBody>
@@ -8660,6 +8654,46 @@
                         </a:spcAft>
                         <a:buNone/>
                       </a:pPr>
+                      <a:endParaRPr/>
+                    </a:p>
+                  </a:txBody>
+                  <a:tcPr marL="91425" marR="91425" marT="91425" marB="91425"/>
+                </a:tc>
+                <a:tc>
+                  <a:txBody>
+                    <a:bodyPr/>
+                    <a:lstStyle/>
+                    <a:p>
+                      <a:pPr marL="0" lvl="0" indent="0" algn="l" rtl="0">
+                        <a:spcBef>
+                          <a:spcPts val="0"/>
+                        </a:spcBef>
+                        <a:spcAft>
+                          <a:spcPts val="0"/>
+                        </a:spcAft>
+                        <a:buNone/>
+                      </a:pPr>
+                      <a:endParaRPr dirty="0"/>
+                    </a:p>
+                  </a:txBody>
+                  <a:tcPr marL="91425" marR="91425" marT="91425" marB="91425">
+                    <a:noFill/>
+                  </a:tcPr>
+                </a:tc>
+                <a:tc>
+                  <a:txBody>
+                    <a:bodyPr/>
+                    <a:lstStyle/>
+                    <a:p>
+                      <a:pPr marL="0" lvl="0" indent="0" algn="l" rtl="0">
+                        <a:spcBef>
+                          <a:spcPts val="0"/>
+                        </a:spcBef>
+                        <a:spcAft>
+                          <a:spcPts val="0"/>
+                        </a:spcAft>
+                        <a:buNone/>
+                      </a:pPr>
                       <a:endParaRPr dirty="0"/>
                     </a:p>
                   </a:txBody>
@@ -8694,7 +8728,7 @@
                   </a:ext>
                 </a:extLst>
               </a:tr>
-              <a:tr h="636175">
+              <a:tr h="533864">
                 <a:tc>
                   <a:txBody>
                     <a:bodyPr/>
@@ -8715,7 +8749,7 @@
                         <a:buNone/>
                       </a:pPr>
                       <a:r>
-                        <a:rPr lang="en-US" sz="1000" b="1">
+                        <a:rPr lang="en-US" sz="1000" b="1" dirty="0">
                           <a:solidFill>
                             <a:schemeClr val="lt1"/>
                           </a:solidFill>
@@ -8726,7 +8760,7 @@
                         </a:rPr>
                         <a:t>5</a:t>
                       </a:r>
-                      <a:endParaRPr sz="1000"/>
+                      <a:endParaRPr sz="1000" dirty="0"/>
                     </a:p>
                   </a:txBody>
                   <a:tcPr marL="91425" marR="91425" marT="91425" marB="91425" anchor="ctr"/>
@@ -8736,9 +8770,25 @@
                     <a:bodyPr/>
                     <a:lstStyle/>
                     <a:p>
-                      <a:pPr algn="ctr"/>
+                      <a:pPr marL="0" marR="0" lvl="0" indent="0" algn="ctr" rtl="0">
+                        <a:lnSpc>
+                          <a:spcPct val="100000"/>
+                        </a:lnSpc>
+                        <a:spcBef>
+                          <a:spcPts val="0"/>
+                        </a:spcBef>
+                        <a:spcAft>
+                          <a:spcPts val="0"/>
+                        </a:spcAft>
+                        <a:buClr>
+                          <a:schemeClr val="dk1"/>
+                        </a:buClr>
+                        <a:buSzPts val="1100"/>
+                        <a:buFont typeface="Arial"/>
+                        <a:buNone/>
+                      </a:pPr>
                       <a:r>
-                        <a:rPr lang="fr-FR" sz="1000" b="1" i="0" u="none" strike="noStrike" cap="none" dirty="0">
+                        <a:rPr lang="en-US" sz="1000" b="1" i="0" u="none" strike="noStrike" cap="none" dirty="0" err="1">
                           <a:solidFill>
                             <a:schemeClr val="bg1"/>
                           </a:solidFill>
@@ -8748,13 +8798,10 @@
                           <a:cs typeface="Arial"/>
                           <a:sym typeface="Arial"/>
                         </a:rPr>
-                        <a:t>Test et ajustements des</a:t>
+                        <a:t>PaiePaiements</a:t>
                       </a:r>
-                    </a:p>
-                    <a:p>
-                      <a:pPr algn="ctr"/>
                       <a:r>
-                        <a:rPr lang="fr-FR" sz="1000" b="1" i="0" u="none" strike="noStrike" cap="none" dirty="0">
+                        <a:rPr lang="en-US" sz="1000" b="1" i="0" u="none" strike="noStrike" cap="none" dirty="0">
                           <a:solidFill>
                             <a:schemeClr val="bg1"/>
                           </a:solidFill>
@@ -8764,7 +8811,33 @@
                           <a:cs typeface="Arial"/>
                           <a:sym typeface="Arial"/>
                         </a:rPr>
-                        <a:t>fonctionnalités</a:t>
+                        <a:t> &amp; Stripe </a:t>
+                      </a:r>
+                      <a:r>
+                        <a:rPr lang="en-US" sz="1000" b="1" i="0" u="none" strike="noStrike" cap="none" dirty="0" err="1">
+                          <a:solidFill>
+                            <a:schemeClr val="bg1"/>
+                          </a:solidFill>
+                          <a:effectLst/>
+                          <a:latin typeface="Syne" panose="020B0604020202020204" charset="0"/>
+                          <a:ea typeface="Arial"/>
+                          <a:cs typeface="Arial"/>
+                          <a:sym typeface="Arial"/>
+                        </a:rPr>
+                        <a:t>Connectments</a:t>
+                      </a:r>
+                      <a:r>
+                        <a:rPr lang="en-US" sz="1000" b="1" i="0" u="none" strike="noStrike" cap="none" dirty="0">
+                          <a:solidFill>
+                            <a:schemeClr val="bg1"/>
+                          </a:solidFill>
+                          <a:effectLst/>
+                          <a:latin typeface="Syne" panose="020B0604020202020204" charset="0"/>
+                          <a:ea typeface="Arial"/>
+                          <a:cs typeface="Arial"/>
+                          <a:sym typeface="Arial"/>
+                        </a:rPr>
+                        <a:t> &amp; Stripe Connect</a:t>
                       </a:r>
                     </a:p>
                   </a:txBody>
@@ -8880,44 +8953,6 @@
                         <a:buNone/>
                       </a:pPr>
                       <a:endParaRPr/>
-                    </a:p>
-                  </a:txBody>
-                  <a:tcPr marL="91425" marR="91425" marT="91425" marB="91425"/>
-                </a:tc>
-                <a:tc>
-                  <a:txBody>
-                    <a:bodyPr/>
-                    <a:lstStyle/>
-                    <a:p>
-                      <a:pPr marL="0" lvl="0" indent="0" algn="l" rtl="0">
-                        <a:spcBef>
-                          <a:spcPts val="0"/>
-                        </a:spcBef>
-                        <a:spcAft>
-                          <a:spcPts val="0"/>
-                        </a:spcAft>
-                        <a:buNone/>
-                      </a:pPr>
-                      <a:endParaRPr/>
-                    </a:p>
-                  </a:txBody>
-                  <a:tcPr marL="91425" marR="91425" marT="91425" marB="91425"/>
-                </a:tc>
-                <a:tc>
-                  <a:txBody>
-                    <a:bodyPr/>
-                    <a:lstStyle/>
-                    <a:p>
-                      <a:pPr marL="0" lvl="0" indent="0" algn="l" rtl="0">
-                        <a:spcBef>
-                          <a:spcPts val="0"/>
-                        </a:spcBef>
-                        <a:spcAft>
-                          <a:spcPts val="0"/>
-                        </a:spcAft>
-                        <a:buNone/>
-                      </a:pPr>
-                      <a:endParaRPr dirty="0"/>
                     </a:p>
                   </a:txBody>
                   <a:tcPr marL="91425" marR="91425" marT="91425" marB="91425"/>
@@ -8964,19 +8999,62 @@
                   </a:txBody>
                   <a:tcPr marL="91425" marR="91425" marT="91425" marB="91425"/>
                 </a:tc>
+                <a:tc>
+                  <a:txBody>
+                    <a:bodyPr/>
+                    <a:lstStyle/>
+                    <a:p>
+                      <a:pPr marL="0" lvl="0" indent="0" algn="l" rtl="0">
+                        <a:spcBef>
+                          <a:spcPts val="0"/>
+                        </a:spcBef>
+                        <a:spcAft>
+                          <a:spcPts val="0"/>
+                        </a:spcAft>
+                        <a:buNone/>
+                      </a:pPr>
+                      <a:endParaRPr dirty="0"/>
+                    </a:p>
+                  </a:txBody>
+                  <a:tcPr marL="91425" marR="91425" marT="91425" marB="91425">
+                    <a:noFill/>
+                  </a:tcPr>
+                </a:tc>
+                <a:tc>
+                  <a:txBody>
+                    <a:bodyPr/>
+                    <a:lstStyle/>
+                    <a:p>
+                      <a:pPr marL="0" lvl="0" indent="0" algn="l" rtl="0">
+                        <a:spcBef>
+                          <a:spcPts val="0"/>
+                        </a:spcBef>
+                        <a:spcAft>
+                          <a:spcPts val="0"/>
+                        </a:spcAft>
+                        <a:buNone/>
+                      </a:pPr>
+                      <a:endParaRPr dirty="0"/>
+                    </a:p>
+                  </a:txBody>
+                  <a:tcPr marL="91425" marR="91425" marT="91425" marB="91425"/>
+                </a:tc>
                 <a:extLst>
                   <a:ext uri="{0D108BD9-81ED-4DB2-BD59-A6C34878D82A}">
                     <a16:rowId xmlns:a16="http://schemas.microsoft.com/office/drawing/2014/main" val="10005"/>
                   </a:ext>
                 </a:extLst>
               </a:tr>
-              <a:tr h="636175">
+              <a:tr h="457887">
                 <a:tc>
                   <a:txBody>
                     <a:bodyPr/>
                     <a:lstStyle/>
                     <a:p>
-                      <a:pPr marL="0" lvl="0" indent="0" algn="ctr" rtl="0">
+                      <a:pPr marL="0" marR="0" lvl="0" indent="0" algn="ctr" rtl="0">
+                        <a:lnSpc>
+                          <a:spcPct val="100000"/>
+                        </a:lnSpc>
                         <a:spcBef>
                           <a:spcPts val="0"/>
                         </a:spcBef>
@@ -8991,18 +9069,22 @@
                         <a:buNone/>
                       </a:pPr>
                       <a:r>
-                        <a:rPr lang="en-US" sz="1000" b="1" dirty="0">
+                        <a:rPr lang="fr-FR" sz="1000" b="1" i="0" u="none" strike="noStrike" cap="none" dirty="0">
                           <a:solidFill>
                             <a:schemeClr val="lt1"/>
                           </a:solidFill>
                           <a:latin typeface="Syne"/>
-                          <a:ea typeface="Syne"/>
-                          <a:cs typeface="Syne"/>
-                          <a:sym typeface="Syne"/>
+                          <a:sym typeface="Arial"/>
                         </a:rPr>
                         <a:t>6</a:t>
                       </a:r>
-                      <a:endParaRPr sz="1000" dirty="0"/>
+                      <a:endParaRPr sz="1000" b="1" i="0" u="none" strike="noStrike" cap="none" dirty="0">
+                        <a:solidFill>
+                          <a:schemeClr val="lt1"/>
+                        </a:solidFill>
+                        <a:latin typeface="Syne"/>
+                        <a:sym typeface="Arial"/>
+                      </a:endParaRPr>
                     </a:p>
                   </a:txBody>
                   <a:tcPr marL="91425" marR="91425" marT="91425" marB="91425" anchor="ctr"/>
@@ -9012,39 +9094,50 @@
                     <a:bodyPr/>
                     <a:lstStyle/>
                     <a:p>
-                      <a:pPr algn="ctr"/>
+                      <a:pPr marL="0" marR="0" lvl="0" indent="0" algn="ctr" rtl="0">
+                        <a:lnSpc>
+                          <a:spcPct val="100000"/>
+                        </a:lnSpc>
+                        <a:spcBef>
+                          <a:spcPts val="0"/>
+                        </a:spcBef>
+                        <a:spcAft>
+                          <a:spcPts val="0"/>
+                        </a:spcAft>
+                        <a:buClr>
+                          <a:schemeClr val="dk1"/>
+                        </a:buClr>
+                        <a:buSzPts val="1100"/>
+                        <a:buFont typeface="Arial"/>
+                        <a:buNone/>
+                      </a:pPr>
                       <a:r>
-                        <a:rPr lang="fr-FR" sz="1000" b="1" dirty="0">
+                        <a:rPr lang="en-US" sz="1000" b="1" i="0" u="none" strike="noStrike" cap="none" dirty="0">
                           <a:solidFill>
                             <a:schemeClr val="bg1"/>
                           </a:solidFill>
+                          <a:effectLst/>
                           <a:latin typeface="Syne" panose="020B0604020202020204" charset="0"/>
+                          <a:ea typeface="Arial"/>
+                          <a:cs typeface="Arial"/>
+                          <a:sym typeface="Arial"/>
                         </a:rPr>
-                        <a:t>P</a:t>
+                        <a:t>Documents &amp; Signature </a:t>
                       </a:r>
                       <a:r>
-                        <a:rPr lang="fr-FR" sz="1000" b="1">
+                        <a:rPr lang="en-US" sz="1000" b="1" i="0" u="none" strike="noStrike" cap="none" dirty="0" err="1">
                           <a:solidFill>
                             <a:schemeClr val="bg1"/>
                           </a:solidFill>
+                          <a:effectLst/>
                           <a:latin typeface="Syne" panose="020B0604020202020204" charset="0"/>
+                          <a:ea typeface="Arial"/>
+                          <a:cs typeface="Arial"/>
+                          <a:sym typeface="Arial"/>
                         </a:rPr>
-                        <a:t>roduction </a:t>
+                        <a:t>Électronique</a:t>
                       </a:r>
-                      <a:r>
-                        <a:rPr lang="fr-FR" sz="1000" b="1" dirty="0">
-                          <a:solidFill>
-                            <a:schemeClr val="bg1"/>
-                          </a:solidFill>
-                          <a:latin typeface="Syne" panose="020B0604020202020204" charset="0"/>
-                        </a:rPr>
-                        <a:t>de la première version (V1)</a:t>
-                      </a:r>
-                      <a:r>
-                        <a:rPr lang="fr-FR" sz="1000" dirty="0"/>
-                        <a:t>.</a:t>
-                      </a:r>
-                      <a:endParaRPr lang="fr-FR" sz="1000" b="1" i="0" u="none" strike="noStrike" cap="none" dirty="0">
+                      <a:endParaRPr lang="en-US" sz="1000" b="1" i="0" u="none" strike="noStrike" cap="none" dirty="0">
                         <a:solidFill>
                           <a:schemeClr val="bg1"/>
                         </a:solidFill>
@@ -9072,7 +9165,7 @@
                         </a:spcAft>
                         <a:buNone/>
                       </a:pPr>
-                      <a:endParaRPr dirty="0"/>
+                      <a:endParaRPr/>
                     </a:p>
                   </a:txBody>
                   <a:tcPr marL="91425" marR="91425" marT="91425" marB="91425"/>
@@ -9186,7 +9279,315 @@
                         </a:spcAft>
                         <a:buNone/>
                       </a:pPr>
+                      <a:endParaRPr/>
+                    </a:p>
+                  </a:txBody>
+                  <a:tcPr marL="91425" marR="91425" marT="91425" marB="91425"/>
+                </a:tc>
+                <a:tc>
+                  <a:txBody>
+                    <a:bodyPr/>
+                    <a:lstStyle/>
+                    <a:p>
+                      <a:pPr marL="0" lvl="0" indent="0" algn="l" rtl="0">
+                        <a:spcBef>
+                          <a:spcPts val="0"/>
+                        </a:spcBef>
+                        <a:spcAft>
+                          <a:spcPts val="0"/>
+                        </a:spcAft>
+                        <a:buNone/>
+                      </a:pPr>
                       <a:endParaRPr dirty="0"/>
+                    </a:p>
+                  </a:txBody>
+                  <a:tcPr marL="91425" marR="91425" marT="91425" marB="91425">
+                    <a:solidFill>
+                      <a:srgbClr val="7030A0"/>
+                    </a:solidFill>
+                  </a:tcPr>
+                </a:tc>
+                <a:tc>
+                  <a:txBody>
+                    <a:bodyPr/>
+                    <a:lstStyle/>
+                    <a:p>
+                      <a:pPr marL="0" lvl="0" indent="0" algn="l" rtl="0">
+                        <a:spcBef>
+                          <a:spcPts val="0"/>
+                        </a:spcBef>
+                        <a:spcAft>
+                          <a:spcPts val="0"/>
+                        </a:spcAft>
+                        <a:buNone/>
+                      </a:pPr>
+                      <a:endParaRPr dirty="0"/>
+                    </a:p>
+                  </a:txBody>
+                  <a:tcPr marL="91425" marR="91425" marT="91425" marB="91425">
+                    <a:noFill/>
+                  </a:tcPr>
+                </a:tc>
+                <a:tc>
+                  <a:txBody>
+                    <a:bodyPr/>
+                    <a:lstStyle/>
+                    <a:p>
+                      <a:pPr marL="0" lvl="0" indent="0" algn="l" rtl="0">
+                        <a:spcBef>
+                          <a:spcPts val="0"/>
+                        </a:spcBef>
+                        <a:spcAft>
+                          <a:spcPts val="0"/>
+                        </a:spcAft>
+                        <a:buNone/>
+                      </a:pPr>
+                      <a:endParaRPr dirty="0"/>
+                    </a:p>
+                  </a:txBody>
+                  <a:tcPr marL="91425" marR="91425" marT="91425" marB="91425"/>
+                </a:tc>
+                <a:extLst>
+                  <a:ext uri="{0D108BD9-81ED-4DB2-BD59-A6C34878D82A}">
+                    <a16:rowId xmlns:a16="http://schemas.microsoft.com/office/drawing/2014/main" val="776611652"/>
+                  </a:ext>
+                </a:extLst>
+              </a:tr>
+              <a:tr h="457887">
+                <a:tc>
+                  <a:txBody>
+                    <a:bodyPr/>
+                    <a:lstStyle/>
+                    <a:p>
+                      <a:pPr marL="0" marR="0" lvl="0" indent="0" algn="ctr" rtl="0">
+                        <a:lnSpc>
+                          <a:spcPct val="100000"/>
+                        </a:lnSpc>
+                        <a:spcBef>
+                          <a:spcPts val="0"/>
+                        </a:spcBef>
+                        <a:spcAft>
+                          <a:spcPts val="0"/>
+                        </a:spcAft>
+                        <a:buClr>
+                          <a:schemeClr val="dk1"/>
+                        </a:buClr>
+                        <a:buSzPts val="1100"/>
+                        <a:buFont typeface="Arial"/>
+                        <a:buNone/>
+                      </a:pPr>
+                      <a:r>
+                        <a:rPr lang="fr-FR" sz="1000" b="1" i="0" u="none" strike="noStrike" cap="none" dirty="0">
+                          <a:solidFill>
+                            <a:schemeClr val="lt1"/>
+                          </a:solidFill>
+                          <a:latin typeface="Syne"/>
+                          <a:sym typeface="Arial"/>
+                        </a:rPr>
+                        <a:t>7</a:t>
+                      </a:r>
+                      <a:endParaRPr sz="1000" b="1" i="0" u="none" strike="noStrike" cap="none" dirty="0">
+                        <a:solidFill>
+                          <a:schemeClr val="lt1"/>
+                        </a:solidFill>
+                        <a:latin typeface="Syne"/>
+                        <a:sym typeface="Arial"/>
+                      </a:endParaRPr>
+                    </a:p>
+                  </a:txBody>
+                  <a:tcPr marL="91425" marR="91425" marT="91425" marB="91425" anchor="ctr"/>
+                </a:tc>
+                <a:tc>
+                  <a:txBody>
+                    <a:bodyPr/>
+                    <a:lstStyle/>
+                    <a:p>
+                      <a:pPr marL="0" marR="0" lvl="0" indent="0" algn="ctr" rtl="0">
+                        <a:lnSpc>
+                          <a:spcPct val="100000"/>
+                        </a:lnSpc>
+                        <a:spcBef>
+                          <a:spcPts val="0"/>
+                        </a:spcBef>
+                        <a:spcAft>
+                          <a:spcPts val="0"/>
+                        </a:spcAft>
+                        <a:buClr>
+                          <a:schemeClr val="dk1"/>
+                        </a:buClr>
+                        <a:buSzPts val="1100"/>
+                        <a:buFont typeface="Arial"/>
+                        <a:buNone/>
+                      </a:pPr>
+                      <a:r>
+                        <a:rPr lang="en-US" sz="1000" b="1" i="0" u="none" strike="noStrike" cap="none" dirty="0">
+                          <a:solidFill>
+                            <a:schemeClr val="bg1"/>
+                          </a:solidFill>
+                          <a:effectLst/>
+                          <a:latin typeface="Syne" panose="020B0604020202020204" charset="0"/>
+                          <a:ea typeface="Arial"/>
+                          <a:cs typeface="Arial"/>
+                          <a:sym typeface="Arial"/>
+                        </a:rPr>
+                        <a:t>Notifications, Emails, SMS &amp; </a:t>
+                      </a:r>
+                      <a:r>
+                        <a:rPr lang="en-US" sz="1000" b="1" i="0" u="none" strike="noStrike" cap="none" dirty="0" err="1">
+                          <a:solidFill>
+                            <a:schemeClr val="bg1"/>
+                          </a:solidFill>
+                          <a:effectLst/>
+                          <a:latin typeface="Syne" panose="020B0604020202020204" charset="0"/>
+                          <a:ea typeface="Arial"/>
+                          <a:cs typeface="Arial"/>
+                          <a:sym typeface="Arial"/>
+                        </a:rPr>
+                        <a:t>Calendrier</a:t>
+                      </a:r>
+                      <a:endParaRPr lang="en-US" sz="1000" b="1" i="0" u="none" strike="noStrike" cap="none" dirty="0">
+                        <a:solidFill>
+                          <a:schemeClr val="bg1"/>
+                        </a:solidFill>
+                        <a:effectLst/>
+                        <a:latin typeface="Syne" panose="020B0604020202020204" charset="0"/>
+                        <a:ea typeface="Arial"/>
+                        <a:cs typeface="Arial"/>
+                        <a:sym typeface="Arial"/>
+                      </a:endParaRPr>
+                    </a:p>
+                  </a:txBody>
+                  <a:tcPr marL="91425" marR="91425" marT="91425" marB="91425" anchor="ctr"/>
+                </a:tc>
+                <a:tc>
+                  <a:txBody>
+                    <a:bodyPr/>
+                    <a:lstStyle/>
+                    <a:p>
+                      <a:pPr marL="0" lvl="0" indent="0" algn="l" rtl="0">
+                        <a:spcBef>
+                          <a:spcPts val="0"/>
+                        </a:spcBef>
+                        <a:spcAft>
+                          <a:spcPts val="0"/>
+                        </a:spcAft>
+                        <a:buNone/>
+                      </a:pPr>
+                      <a:endParaRPr/>
+                    </a:p>
+                  </a:txBody>
+                  <a:tcPr marL="91425" marR="91425" marT="91425" marB="91425"/>
+                </a:tc>
+                <a:tc>
+                  <a:txBody>
+                    <a:bodyPr/>
+                    <a:lstStyle/>
+                    <a:p>
+                      <a:pPr marL="0" lvl="0" indent="0" algn="l" rtl="0">
+                        <a:spcBef>
+                          <a:spcPts val="0"/>
+                        </a:spcBef>
+                        <a:spcAft>
+                          <a:spcPts val="0"/>
+                        </a:spcAft>
+                        <a:buNone/>
+                      </a:pPr>
+                      <a:endParaRPr/>
+                    </a:p>
+                  </a:txBody>
+                  <a:tcPr marL="91425" marR="91425" marT="91425" marB="91425"/>
+                </a:tc>
+                <a:tc>
+                  <a:txBody>
+                    <a:bodyPr/>
+                    <a:lstStyle/>
+                    <a:p>
+                      <a:pPr marL="0" lvl="0" indent="0" algn="l" rtl="0">
+                        <a:spcBef>
+                          <a:spcPts val="0"/>
+                        </a:spcBef>
+                        <a:spcAft>
+                          <a:spcPts val="0"/>
+                        </a:spcAft>
+                        <a:buNone/>
+                      </a:pPr>
+                      <a:endParaRPr/>
+                    </a:p>
+                  </a:txBody>
+                  <a:tcPr marL="91425" marR="91425" marT="91425" marB="91425"/>
+                </a:tc>
+                <a:tc>
+                  <a:txBody>
+                    <a:bodyPr/>
+                    <a:lstStyle/>
+                    <a:p>
+                      <a:pPr marL="0" lvl="0" indent="0" algn="l" rtl="0">
+                        <a:spcBef>
+                          <a:spcPts val="0"/>
+                        </a:spcBef>
+                        <a:spcAft>
+                          <a:spcPts val="0"/>
+                        </a:spcAft>
+                        <a:buNone/>
+                      </a:pPr>
+                      <a:endParaRPr/>
+                    </a:p>
+                  </a:txBody>
+                  <a:tcPr marL="91425" marR="91425" marT="91425" marB="91425"/>
+                </a:tc>
+                <a:tc>
+                  <a:txBody>
+                    <a:bodyPr/>
+                    <a:lstStyle/>
+                    <a:p>
+                      <a:pPr marL="0" lvl="0" indent="0" algn="l" rtl="0">
+                        <a:spcBef>
+                          <a:spcPts val="0"/>
+                        </a:spcBef>
+                        <a:spcAft>
+                          <a:spcPts val="0"/>
+                        </a:spcAft>
+                        <a:buNone/>
+                      </a:pPr>
+                      <a:endParaRPr/>
+                    </a:p>
+                  </a:txBody>
+                  <a:tcPr marL="91425" marR="91425" marT="91425" marB="91425"/>
+                </a:tc>
+                <a:tc>
+                  <a:txBody>
+                    <a:bodyPr/>
+                    <a:lstStyle/>
+                    <a:p>
+                      <a:pPr marL="0" lvl="0" indent="0" algn="l" rtl="0">
+                        <a:spcBef>
+                          <a:spcPts val="0"/>
+                        </a:spcBef>
+                        <a:spcAft>
+                          <a:spcPts val="0"/>
+                        </a:spcAft>
+                        <a:buNone/>
+                      </a:pPr>
+                      <a:endParaRPr/>
+                    </a:p>
+                  </a:txBody>
+                  <a:tcPr marL="91425" marR="91425" marT="91425" marB="91425"/>
+                </a:tc>
+                <a:tc>
+                  <a:txBody>
+                    <a:bodyPr/>
+                    <a:lstStyle/>
+                    <a:p>
+                      <a:pPr marL="0" lvl="0" indent="0" algn="l" rtl="0">
+                        <a:spcBef>
+                          <a:spcPts val="0"/>
+                        </a:spcBef>
+                        <a:spcAft>
+                          <a:spcPts val="0"/>
+                        </a:spcAft>
+                        <a:buNone/>
+                      </a:pPr>
+                      <a:endParaRPr/>
                     </a:p>
                   </a:txBody>
                   <a:tcPr marL="91425" marR="91425" marT="91425" marB="91425"/>
@@ -9227,7 +9628,318 @@
                       <a:endParaRPr dirty="0"/>
                     </a:p>
                   </a:txBody>
+                  <a:tcPr marL="91425" marR="91425" marT="91425" marB="91425">
+                    <a:solidFill>
+                      <a:srgbClr val="7030A0"/>
+                    </a:solidFill>
+                  </a:tcPr>
+                </a:tc>
+                <a:tc>
+                  <a:txBody>
+                    <a:bodyPr/>
+                    <a:lstStyle/>
+                    <a:p>
+                      <a:pPr marL="0" lvl="0" indent="0" algn="l" rtl="0">
+                        <a:spcBef>
+                          <a:spcPts val="0"/>
+                        </a:spcBef>
+                        <a:spcAft>
+                          <a:spcPts val="0"/>
+                        </a:spcAft>
+                        <a:buNone/>
+                      </a:pPr>
+                      <a:endParaRPr dirty="0"/>
+                    </a:p>
+                  </a:txBody>
                   <a:tcPr marL="91425" marR="91425" marT="91425" marB="91425"/>
+                </a:tc>
+                <a:extLst>
+                  <a:ext uri="{0D108BD9-81ED-4DB2-BD59-A6C34878D82A}">
+                    <a16:rowId xmlns:a16="http://schemas.microsoft.com/office/drawing/2014/main" val="3190279453"/>
+                  </a:ext>
+                </a:extLst>
+              </a:tr>
+              <a:tr h="457887">
+                <a:tc>
+                  <a:txBody>
+                    <a:bodyPr/>
+                    <a:lstStyle/>
+                    <a:p>
+                      <a:pPr marL="0" marR="0" lvl="0" indent="0" algn="ctr" rtl="0">
+                        <a:lnSpc>
+                          <a:spcPct val="100000"/>
+                        </a:lnSpc>
+                        <a:spcBef>
+                          <a:spcPts val="0"/>
+                        </a:spcBef>
+                        <a:spcAft>
+                          <a:spcPts val="0"/>
+                        </a:spcAft>
+                        <a:buClr>
+                          <a:schemeClr val="dk1"/>
+                        </a:buClr>
+                        <a:buSzPts val="1100"/>
+                        <a:buFont typeface="Arial"/>
+                        <a:buNone/>
+                      </a:pPr>
+                      <a:r>
+                        <a:rPr lang="fr-FR" sz="1000" b="1" i="0" u="none" strike="noStrike" cap="none" dirty="0">
+                          <a:solidFill>
+                            <a:schemeClr val="lt1"/>
+                          </a:solidFill>
+                          <a:latin typeface="Syne"/>
+                          <a:sym typeface="Arial"/>
+                        </a:rPr>
+                        <a:t>8</a:t>
+                      </a:r>
+                      <a:endParaRPr sz="1000" b="1" i="0" u="none" strike="noStrike" cap="none" dirty="0">
+                        <a:solidFill>
+                          <a:schemeClr val="lt1"/>
+                        </a:solidFill>
+                        <a:latin typeface="Syne"/>
+                        <a:sym typeface="Arial"/>
+                      </a:endParaRPr>
+                    </a:p>
+                  </a:txBody>
+                  <a:tcPr marL="91425" marR="91425" marT="91425" marB="91425" anchor="ctr"/>
+                </a:tc>
+                <a:tc>
+                  <a:txBody>
+                    <a:bodyPr/>
+                    <a:lstStyle/>
+                    <a:p>
+                      <a:pPr marL="0" marR="0" lvl="0" indent="0" algn="ctr" rtl="0">
+                        <a:lnSpc>
+                          <a:spcPct val="100000"/>
+                        </a:lnSpc>
+                        <a:spcBef>
+                          <a:spcPts val="0"/>
+                        </a:spcBef>
+                        <a:spcAft>
+                          <a:spcPts val="0"/>
+                        </a:spcAft>
+                        <a:buClr>
+                          <a:schemeClr val="dk1"/>
+                        </a:buClr>
+                        <a:buSzPts val="1100"/>
+                        <a:buFont typeface="Arial"/>
+                        <a:buNone/>
+                      </a:pPr>
+                      <a:r>
+                        <a:rPr lang="en-US" sz="1000" b="1" i="0" u="none" strike="noStrike" cap="none" dirty="0">
+                          <a:solidFill>
+                            <a:schemeClr val="bg1"/>
+                          </a:solidFill>
+                          <a:effectLst/>
+                          <a:latin typeface="Syne" panose="020B0604020202020204" charset="0"/>
+                          <a:ea typeface="Arial"/>
+                          <a:cs typeface="Arial"/>
+                          <a:sym typeface="Arial"/>
+                        </a:rPr>
+                        <a:t>Admin Panel, Dashboard, Tests &amp; </a:t>
+                      </a:r>
+                      <a:r>
+                        <a:rPr lang="en-US" sz="1000" b="1" i="0" u="none" strike="noStrike" cap="none" dirty="0" err="1">
+                          <a:solidFill>
+                            <a:schemeClr val="bg1"/>
+                          </a:solidFill>
+                          <a:effectLst/>
+                          <a:latin typeface="Syne" panose="020B0604020202020204" charset="0"/>
+                          <a:ea typeface="Arial"/>
+                          <a:cs typeface="Arial"/>
+                          <a:sym typeface="Arial"/>
+                        </a:rPr>
+                        <a:t>Déploiement</a:t>
+                      </a:r>
+                      <a:r>
+                        <a:rPr lang="en-US" sz="1000" b="1" i="0" u="none" strike="noStrike" cap="none" dirty="0">
+                          <a:solidFill>
+                            <a:schemeClr val="bg1"/>
+                          </a:solidFill>
+                          <a:effectLst/>
+                          <a:latin typeface="Syne" panose="020B0604020202020204" charset="0"/>
+                          <a:ea typeface="Arial"/>
+                          <a:cs typeface="Arial"/>
+                          <a:sym typeface="Arial"/>
+                        </a:rPr>
+                        <a:t> </a:t>
+                      </a:r>
+                    </a:p>
+                  </a:txBody>
+                  <a:tcPr marL="91425" marR="91425" marT="91425" marB="91425" anchor="ctr"/>
+                </a:tc>
+                <a:tc>
+                  <a:txBody>
+                    <a:bodyPr/>
+                    <a:lstStyle/>
+                    <a:p>
+                      <a:pPr marL="0" lvl="0" indent="0" algn="l" rtl="0">
+                        <a:spcBef>
+                          <a:spcPts val="0"/>
+                        </a:spcBef>
+                        <a:spcAft>
+                          <a:spcPts val="0"/>
+                        </a:spcAft>
+                        <a:buNone/>
+                      </a:pPr>
+                      <a:endParaRPr/>
+                    </a:p>
+                  </a:txBody>
+                  <a:tcPr marL="91425" marR="91425" marT="91425" marB="91425"/>
+                </a:tc>
+                <a:tc>
+                  <a:txBody>
+                    <a:bodyPr/>
+                    <a:lstStyle/>
+                    <a:p>
+                      <a:pPr marL="0" lvl="0" indent="0" algn="l" rtl="0">
+                        <a:spcBef>
+                          <a:spcPts val="0"/>
+                        </a:spcBef>
+                        <a:spcAft>
+                          <a:spcPts val="0"/>
+                        </a:spcAft>
+                        <a:buNone/>
+                      </a:pPr>
+                      <a:endParaRPr/>
+                    </a:p>
+                  </a:txBody>
+                  <a:tcPr marL="91425" marR="91425" marT="91425" marB="91425"/>
+                </a:tc>
+                <a:tc>
+                  <a:txBody>
+                    <a:bodyPr/>
+                    <a:lstStyle/>
+                    <a:p>
+                      <a:pPr marL="0" lvl="0" indent="0" algn="l" rtl="0">
+                        <a:spcBef>
+                          <a:spcPts val="0"/>
+                        </a:spcBef>
+                        <a:spcAft>
+                          <a:spcPts val="0"/>
+                        </a:spcAft>
+                        <a:buNone/>
+                      </a:pPr>
+                      <a:endParaRPr/>
+                    </a:p>
+                  </a:txBody>
+                  <a:tcPr marL="91425" marR="91425" marT="91425" marB="91425"/>
+                </a:tc>
+                <a:tc>
+                  <a:txBody>
+                    <a:bodyPr/>
+                    <a:lstStyle/>
+                    <a:p>
+                      <a:pPr marL="0" lvl="0" indent="0" algn="l" rtl="0">
+                        <a:spcBef>
+                          <a:spcPts val="0"/>
+                        </a:spcBef>
+                        <a:spcAft>
+                          <a:spcPts val="0"/>
+                        </a:spcAft>
+                        <a:buNone/>
+                      </a:pPr>
+                      <a:endParaRPr/>
+                    </a:p>
+                  </a:txBody>
+                  <a:tcPr marL="91425" marR="91425" marT="91425" marB="91425"/>
+                </a:tc>
+                <a:tc>
+                  <a:txBody>
+                    <a:bodyPr/>
+                    <a:lstStyle/>
+                    <a:p>
+                      <a:pPr marL="0" lvl="0" indent="0" algn="l" rtl="0">
+                        <a:spcBef>
+                          <a:spcPts val="0"/>
+                        </a:spcBef>
+                        <a:spcAft>
+                          <a:spcPts val="0"/>
+                        </a:spcAft>
+                        <a:buNone/>
+                      </a:pPr>
+                      <a:endParaRPr/>
+                    </a:p>
+                  </a:txBody>
+                  <a:tcPr marL="91425" marR="91425" marT="91425" marB="91425"/>
+                </a:tc>
+                <a:tc>
+                  <a:txBody>
+                    <a:bodyPr/>
+                    <a:lstStyle/>
+                    <a:p>
+                      <a:pPr marL="0" lvl="0" indent="0" algn="l" rtl="0">
+                        <a:spcBef>
+                          <a:spcPts val="0"/>
+                        </a:spcBef>
+                        <a:spcAft>
+                          <a:spcPts val="0"/>
+                        </a:spcAft>
+                        <a:buNone/>
+                      </a:pPr>
+                      <a:endParaRPr/>
+                    </a:p>
+                  </a:txBody>
+                  <a:tcPr marL="91425" marR="91425" marT="91425" marB="91425"/>
+                </a:tc>
+                <a:tc>
+                  <a:txBody>
+                    <a:bodyPr/>
+                    <a:lstStyle/>
+                    <a:p>
+                      <a:pPr marL="0" lvl="0" indent="0" algn="l" rtl="0">
+                        <a:spcBef>
+                          <a:spcPts val="0"/>
+                        </a:spcBef>
+                        <a:spcAft>
+                          <a:spcPts val="0"/>
+                        </a:spcAft>
+                        <a:buNone/>
+                      </a:pPr>
+                      <a:endParaRPr/>
+                    </a:p>
+                  </a:txBody>
+                  <a:tcPr marL="91425" marR="91425" marT="91425" marB="91425"/>
+                </a:tc>
+                <a:tc>
+                  <a:txBody>
+                    <a:bodyPr/>
+                    <a:lstStyle/>
+                    <a:p>
+                      <a:pPr marL="0" lvl="0" indent="0" algn="l" rtl="0">
+                        <a:spcBef>
+                          <a:spcPts val="0"/>
+                        </a:spcBef>
+                        <a:spcAft>
+                          <a:spcPts val="0"/>
+                        </a:spcAft>
+                        <a:buNone/>
+                      </a:pPr>
+                      <a:endParaRPr dirty="0"/>
+                    </a:p>
+                  </a:txBody>
+                  <a:tcPr marL="91425" marR="91425" marT="91425" marB="91425"/>
+                </a:tc>
+                <a:tc>
+                  <a:txBody>
+                    <a:bodyPr/>
+                    <a:lstStyle/>
+                    <a:p>
+                      <a:pPr marL="0" lvl="0" indent="0" algn="l" rtl="0">
+                        <a:spcBef>
+                          <a:spcPts val="0"/>
+                        </a:spcBef>
+                        <a:spcAft>
+                          <a:spcPts val="0"/>
+                        </a:spcAft>
+                        <a:buNone/>
+                      </a:pPr>
+                      <a:endParaRPr dirty="0"/>
+                    </a:p>
+                  </a:txBody>
+                  <a:tcPr marL="91425" marR="91425" marT="91425" marB="91425">
+                    <a:noFill/>
+                  </a:tcPr>
                 </a:tc>
                 <a:tc>
                   <a:txBody>
@@ -9254,7 +9966,7 @@
                 </a:tc>
                 <a:extLst>
                   <a:ext uri="{0D108BD9-81ED-4DB2-BD59-A6C34878D82A}">
-                    <a16:rowId xmlns:a16="http://schemas.microsoft.com/office/drawing/2014/main" val="10006"/>
+                    <a16:rowId xmlns:a16="http://schemas.microsoft.com/office/drawing/2014/main" val="2557297614"/>
                   </a:ext>
                 </a:extLst>
               </a:tr>
@@ -9371,7 +10083,7 @@
         <p:grpSpPr>
           <a:xfrm>
             <a:off x="4225402" y="1080777"/>
-            <a:ext cx="1005244" cy="4782598"/>
+            <a:ext cx="1005244" cy="4642887"/>
             <a:chOff x="9536799" y="1044208"/>
             <a:chExt cx="1005244" cy="4782598"/>
           </a:xfrm>
@@ -11875,7 +12587,7 @@
               <a:buNone/>
             </a:pPr>
             <a:r>
-              <a:rPr lang="en-US" sz="2700" b="1" i="0" u="none" strike="noStrike" cap="none">
+              <a:rPr lang="en-US" sz="2700" b="1" i="0" u="none" strike="noStrike" cap="none" dirty="0">
                 <a:solidFill>
                   <a:srgbClr val="FFFFFF"/>
                 </a:solidFill>
@@ -11884,9 +12596,105 @@
                 <a:cs typeface="Syne"/>
                 <a:sym typeface="Syne"/>
               </a:rPr>
-              <a:t> Progrès réalisés cette semaine : </a:t>
+              <a:t> </a:t>
             </a:r>
-            <a:endParaRPr sz="2700" b="0" i="0" u="none" strike="noStrike" cap="none">
+            <a:r>
+              <a:rPr lang="en-US" sz="2700" b="1" i="0" u="none" strike="noStrike" cap="none" dirty="0" err="1">
+                <a:solidFill>
+                  <a:srgbClr val="FFFFFF"/>
+                </a:solidFill>
+                <a:latin typeface="Syne"/>
+                <a:ea typeface="Syne"/>
+                <a:cs typeface="Syne"/>
+                <a:sym typeface="Syne"/>
+              </a:rPr>
+              <a:t>Progrès</a:t>
+            </a:r>
+            <a:r>
+              <a:rPr lang="en-US" sz="2700" b="1" i="0" u="none" strike="noStrike" cap="none" dirty="0">
+                <a:solidFill>
+                  <a:srgbClr val="FFFFFF"/>
+                </a:solidFill>
+                <a:latin typeface="Syne"/>
+                <a:ea typeface="Syne"/>
+                <a:cs typeface="Syne"/>
+                <a:sym typeface="Syne"/>
+              </a:rPr>
+              <a:t> </a:t>
+            </a:r>
+            <a:r>
+              <a:rPr lang="en-US" sz="2700" b="1" i="0" u="none" strike="noStrike" cap="none" dirty="0" err="1">
+                <a:solidFill>
+                  <a:srgbClr val="FFFFFF"/>
+                </a:solidFill>
+                <a:latin typeface="Syne"/>
+                <a:ea typeface="Syne"/>
+                <a:cs typeface="Syne"/>
+                <a:sym typeface="Syne"/>
+              </a:rPr>
+              <a:t>réalisés</a:t>
+            </a:r>
+            <a:r>
+              <a:rPr lang="en-US" sz="2700" b="1" i="0" u="none" strike="noStrike" cap="none" dirty="0">
+                <a:solidFill>
+                  <a:srgbClr val="FFFFFF"/>
+                </a:solidFill>
+                <a:latin typeface="Syne"/>
+                <a:ea typeface="Syne"/>
+                <a:cs typeface="Syne"/>
+                <a:sym typeface="Syne"/>
+              </a:rPr>
+              <a:t> </a:t>
+            </a:r>
+            <a:r>
+              <a:rPr lang="en-US" sz="2700" b="1" i="0" u="none" strike="noStrike" cap="none" dirty="0" err="1">
+                <a:solidFill>
+                  <a:srgbClr val="FFFFFF"/>
+                </a:solidFill>
+                <a:latin typeface="Syne"/>
+                <a:ea typeface="Syne"/>
+                <a:cs typeface="Syne"/>
+                <a:sym typeface="Syne"/>
+              </a:rPr>
+              <a:t>cette</a:t>
+            </a:r>
+            <a:r>
+              <a:rPr lang="en-US" sz="2700" b="1" i="0" u="none" strike="noStrike" cap="none" dirty="0">
+                <a:solidFill>
+                  <a:srgbClr val="FFFFFF"/>
+                </a:solidFill>
+                <a:latin typeface="Syne"/>
+                <a:ea typeface="Syne"/>
+                <a:cs typeface="Syne"/>
+                <a:sym typeface="Syne"/>
+              </a:rPr>
+              <a:t> </a:t>
+            </a:r>
+            <a:r>
+              <a:rPr lang="en-US" sz="2700" b="1" i="0" u="none" strike="noStrike" cap="none" dirty="0" err="1">
+                <a:solidFill>
+                  <a:srgbClr val="FFFFFF"/>
+                </a:solidFill>
+                <a:latin typeface="Syne"/>
+                <a:ea typeface="Syne"/>
+                <a:cs typeface="Syne"/>
+                <a:sym typeface="Syne"/>
+              </a:rPr>
+              <a:t>semaine</a:t>
+            </a:r>
+            <a:r>
+              <a:rPr lang="en-US" sz="2700" b="1" i="0" u="none" strike="noStrike" cap="none" dirty="0">
+                <a:solidFill>
+                  <a:srgbClr val="FFFFFF"/>
+                </a:solidFill>
+                <a:latin typeface="Syne"/>
+                <a:ea typeface="Syne"/>
+                <a:cs typeface="Syne"/>
+                <a:sym typeface="Syne"/>
+              </a:rPr>
+              <a:t> : </a:t>
+            </a:r>
+            <a:endParaRPr sz="2700" b="0" i="0" u="none" strike="noStrike" cap="none" dirty="0">
               <a:solidFill>
                 <a:schemeClr val="dk1"/>
               </a:solidFill>

</xml_diff>